<commit_message>
REPORTGEN-870: fix error in template
</commit_message>
<xml_diff>
--- a/CastReporting.Reporting.Core/Templates/Application/Component library/Generic Table Definition.pptx
+++ b/CastReporting.Reporting.Core/Templates/Application/Component library/Generic Table Definition.pptx
@@ -221,7 +221,7 @@
           <a:p>
             <a:fld id="{BE7CF963-E58D-FC4D-BA9E-60A980752DC6}" type="datetimeFigureOut">
               <a:rPr lang="en-US" smtClean="0"/>
-              <a:t>9/19/2019</a:t>
+              <a:t>7/2/2020</a:t>
             </a:fld>
             <a:endParaRPr lang="en-US"/>
           </a:p>
@@ -878,7 +878,7 @@
           <a:p>
             <a:fld id="{B590C078-9131-4E49-8A0D-400FEE8377B5}" type="datetimeFigureOut">
               <a:rPr lang="en-US" smtClean="0"/>
-              <a:t>9/19/2019</a:t>
+              <a:t>7/2/2020</a:t>
             </a:fld>
             <a:endParaRPr lang="en-US"/>
           </a:p>
@@ -4463,7 +4463,7 @@
           <a:p>
             <a:fld id="{B590C078-9131-4E49-8A0D-400FEE8377B5}" type="datetimeFigureOut">
               <a:rPr lang="en-US" smtClean="0"/>
-              <a:t>9/19/2019</a:t>
+              <a:t>7/2/2020</a:t>
             </a:fld>
             <a:endParaRPr lang="en-US"/>
           </a:p>
@@ -8541,7 +8541,7 @@
           <a:p>
             <a:fld id="{B590C078-9131-4E49-8A0D-400FEE8377B5}" type="datetimeFigureOut">
               <a:rPr lang="en-US" smtClean="0"/>
-              <a:t>9/19/2019</a:t>
+              <a:t>7/2/2020</a:t>
             </a:fld>
             <a:endParaRPr lang="en-US"/>
           </a:p>
@@ -12366,7 +12366,7 @@
           <a:p>
             <a:fld id="{B590C078-9131-4E49-8A0D-400FEE8377B5}" type="datetimeFigureOut">
               <a:rPr lang="en-US" smtClean="0"/>
-              <a:t>9/19/2019</a:t>
+              <a:t>7/2/2020</a:t>
             </a:fld>
             <a:endParaRPr lang="en-US"/>
           </a:p>
@@ -21647,7 +21647,7 @@
       </p:sp>
       <p:sp>
         <p:nvSpPr>
-          <p:cNvPr id="7" name="Text Placeholder 6" descr="TABLE;GENERIC_TABLE;COL1=METRICS,ROW1=MODULES,ROW11=SNAPSHOTS,METRICS=HEALTH_FACTOR,SNAPSHOTS=CURRENT|PREVIOUS,MODULES=ALL"/>
+          <p:cNvPr id="7" name="Text Placeholder 6"/>
           <p:cNvSpPr>
             <a:spLocks noGrp="1"/>
           </p:cNvSpPr>
@@ -22285,12 +22285,12 @@
                         </a:spcAft>
                       </a:pPr>
                       <a:r>
-                        <a:rPr lang="en-GB" sz="1000">
+                        <a:rPr lang="en-GB" sz="1000" dirty="0">
                           <a:effectLst/>
                         </a:rPr>
                         <a:t>score</a:t>
                       </a:r>
-                      <a:endParaRPr lang="en-US" sz="1100">
+                      <a:endParaRPr lang="en-US" sz="1100" dirty="0">
                         <a:effectLst/>
                         <a:latin typeface="Calibri" panose="020F0502020204030204" pitchFamily="34" charset="0"/>
                         <a:ea typeface="Calibri" panose="020F0502020204030204" pitchFamily="34" charset="0"/>
@@ -22322,7 +22322,7 @@
                         </a:rPr>
                         <a:t>score</a:t>
                       </a:r>
-                      <a:endParaRPr lang="en-US" sz="1100">
+                      <a:endParaRPr lang="en-US" sz="1100" dirty="0">
                         <a:effectLst/>
                         <a:latin typeface="Calibri" panose="020F0502020204030204" pitchFamily="34" charset="0"/>
                         <a:ea typeface="Calibri" panose="020F0502020204030204" pitchFamily="34" charset="0"/>

</xml_diff>